<commit_message>
added presentation for wahl and hyper
</commit_message>
<xml_diff>
--- a/Acceptance Test.pptx
+++ b/Acceptance Test.pptx
@@ -8,6 +8,8 @@
     <p:sldId id="256" r:id="rId2"/>
     <p:sldId id="257" r:id="rId3"/>
     <p:sldId id="258" r:id="rId4"/>
+    <p:sldId id="259" r:id="rId5"/>
+    <p:sldId id="260" r:id="rId6"/>
   </p:sldIdLst>
   <p:sldSz cx="12192000" cy="6858000"/>
   <p:notesSz cx="6858000" cy="9144000"/>
@@ -109,27 +111,36 @@
   <p:extLst>
     <p:ext uri="{521415D9-36F7-43E2-AB2F-B90AF26B5E84}">
       <p14:sectionLst xmlns:p14="http://schemas.microsoft.com/office/powerpoint/2010/main">
-        <p14:section name="Standardabschnitt" id="{B68C7C1D-8F8E-4CE6-9B3E-D33ADDF79CAB}">
+        <p14:section name="Intro" id="{B68C7C1D-8F8E-4CE6-9B3E-D33ADDF79CAB}">
           <p14:sldIdLst>
             <p14:sldId id="256"/>
           </p14:sldIdLst>
         </p14:section>
-        <p14:section name="Abschnitt ohne Titel" id="{A8215C15-7968-4C6C-97E9-6D8105882C4C}">
+        <p14:section name="Analyse" id="{A8215C15-7968-4C6C-97E9-6D8105882C4C}">
           <p14:sldIdLst>
             <p14:sldId id="257"/>
             <p14:sldId id="258"/>
           </p14:sldIdLst>
         </p14:section>
+        <p14:section name="Voting &amp; Hyper" id="{55F5D673-B0AA-4E1D-89FB-0CD620230AD2}">
+          <p14:sldIdLst>
+            <p14:sldId id="259"/>
+            <p14:sldId id="260"/>
+          </p14:sldIdLst>
+        </p14:section>
       </p14:sectionLst>
+    </p:ext>
+    <p:ext uri="{EFAFB233-063F-42B5-8137-9DF3F51BA10A}">
+      <p15:sldGuideLst xmlns:p15="http://schemas.microsoft.com/office/powerpoint/2012/main"/>
     </p:ext>
   </p:extLst>
 </p:presentation>
 </file>
 
 <file path=ppt/charts/chart1.xml><?xml version="1.0" encoding="utf-8"?>
-<c:chartSpace xmlns:c="http://schemas.openxmlformats.org/drawingml/2006/chart" xmlns:a="http://schemas.openxmlformats.org/drawingml/2006/main" xmlns:r="http://schemas.openxmlformats.org/officeDocument/2006/relationships">
+<c:chartSpace xmlns:c="http://schemas.openxmlformats.org/drawingml/2006/chart" xmlns:a="http://schemas.openxmlformats.org/drawingml/2006/main" xmlns:r="http://schemas.openxmlformats.org/officeDocument/2006/relationships" xmlns:c16r2="http://schemas.microsoft.com/office/drawing/2015/06/chart">
   <c:date1904 val="0"/>
-  <c:lang val="de-DE"/>
+  <c:lang val="en-US"/>
   <c:roundedCorners val="0"/>
   <mc:AlternateContent xmlns:mc="http://schemas.openxmlformats.org/markup-compatibility/2006">
     <mc:Choice xmlns:c14="http://schemas.microsoft.com/office/drawing/2007/8/2/chart" Requires="c14">
@@ -175,7 +186,6 @@
           </a:p>
         </c:rich>
       </c:tx>
-      <c:layout/>
       <c:overlay val="0"/>
       <c:spPr>
         <a:noFill/>
@@ -201,7 +211,7 @@
               <a:cs typeface="+mn-cs"/>
             </a:defRPr>
           </a:pPr>
-          <a:endParaRPr lang="de-DE"/>
+          <a:endParaRPr lang="en-US"/>
         </a:p>
       </c:txPr>
     </c:title>
@@ -259,6 +269,11 @@
               </c:numCache>
             </c:numRef>
           </c:val>
+          <c:extLst>
+            <c:ext xmlns:c16="http://schemas.microsoft.com/office/drawing/2014/chart" uri="{C3380CC4-5D6E-409C-BE32-E72D297353CC}">
+              <c16:uniqueId val="{00000000-2787-468B-B4EB-96D43783986F}"/>
+            </c:ext>
+          </c:extLst>
         </c:ser>
         <c:ser>
           <c:idx val="1"/>
@@ -307,6 +322,11 @@
               </c:numCache>
             </c:numRef>
           </c:val>
+          <c:extLst>
+            <c:ext xmlns:c16="http://schemas.microsoft.com/office/drawing/2014/chart" uri="{C3380CC4-5D6E-409C-BE32-E72D297353CC}">
+              <c16:uniqueId val="{00000001-2787-468B-B4EB-96D43783986F}"/>
+            </c:ext>
+          </c:extLst>
         </c:ser>
         <c:ser>
           <c:idx val="2"/>
@@ -355,6 +375,11 @@
               </c:numCache>
             </c:numRef>
           </c:val>
+          <c:extLst>
+            <c:ext xmlns:c16="http://schemas.microsoft.com/office/drawing/2014/chart" uri="{C3380CC4-5D6E-409C-BE32-E72D297353CC}">
+              <c16:uniqueId val="{00000002-2787-468B-B4EB-96D43783986F}"/>
+            </c:ext>
+          </c:extLst>
         </c:ser>
         <c:ser>
           <c:idx val="3"/>
@@ -403,6 +428,11 @@
               </c:numCache>
             </c:numRef>
           </c:val>
+          <c:extLst>
+            <c:ext xmlns:c16="http://schemas.microsoft.com/office/drawing/2014/chart" uri="{C3380CC4-5D6E-409C-BE32-E72D297353CC}">
+              <c16:uniqueId val="{00000003-2787-468B-B4EB-96D43783986F}"/>
+            </c:ext>
+          </c:extLst>
         </c:ser>
         <c:dLbls>
           <c:showLegendKey val="0"/>
@@ -458,7 +488,7 @@
                 <a:cs typeface="+mn-cs"/>
               </a:defRPr>
             </a:pPr>
-            <a:endParaRPr lang="de-DE"/>
+            <a:endParaRPr lang="en-US"/>
           </a:p>
         </c:txPr>
         <c:crossAx val="421926672"/>
@@ -517,7 +547,7 @@
                 <a:cs typeface="+mn-cs"/>
               </a:defRPr>
             </a:pPr>
-            <a:endParaRPr lang="de-DE"/>
+            <a:endParaRPr lang="en-US"/>
           </a:p>
         </c:txPr>
         <c:crossAx val="421921576"/>
@@ -534,7 +564,6 @@
     </c:plotArea>
     <c:legend>
       <c:legendPos val="b"/>
-      <c:layout/>
       <c:overlay val="0"/>
       <c:spPr>
         <a:noFill/>
@@ -560,7 +589,7 @@
               <a:cs typeface="+mn-cs"/>
             </a:defRPr>
           </a:pPr>
-          <a:endParaRPr lang="de-DE"/>
+          <a:endParaRPr lang="en-US"/>
         </a:p>
       </c:txPr>
     </c:legend>
@@ -582,7 +611,7 @@
       <a:pPr>
         <a:defRPr/>
       </a:pPr>
-      <a:endParaRPr lang="de-DE"/>
+      <a:endParaRPr lang="en-US"/>
     </a:p>
   </c:txPr>
   <c:externalData r:id="rId3">
@@ -592,9 +621,9 @@
 </file>
 
 <file path=ppt/charts/chart2.xml><?xml version="1.0" encoding="utf-8"?>
-<c:chartSpace xmlns:c="http://schemas.openxmlformats.org/drawingml/2006/chart" xmlns:a="http://schemas.openxmlformats.org/drawingml/2006/main" xmlns:r="http://schemas.openxmlformats.org/officeDocument/2006/relationships">
+<c:chartSpace xmlns:c="http://schemas.openxmlformats.org/drawingml/2006/chart" xmlns:a="http://schemas.openxmlformats.org/drawingml/2006/main" xmlns:r="http://schemas.openxmlformats.org/officeDocument/2006/relationships" xmlns:c16r2="http://schemas.microsoft.com/office/drawing/2015/06/chart">
   <c:date1904 val="0"/>
-  <c:lang val="de-DE"/>
+  <c:lang val="en-US"/>
   <c:roundedCorners val="0"/>
   <mc:AlternateContent xmlns:mc="http://schemas.openxmlformats.org/markup-compatibility/2006">
     <mc:Choice xmlns:c14="http://schemas.microsoft.com/office/drawing/2007/8/2/chart" Requires="c14">
@@ -695,9 +724,13 @@
               </c:numCache>
             </c:numRef>
           </c:val>
+          <c:extLst>
+            <c:ext xmlns:c16="http://schemas.microsoft.com/office/drawing/2014/chart" uri="{C3380CC4-5D6E-409C-BE32-E72D297353CC}">
+              <c16:uniqueId val="{00000000-A39D-428A-A369-76D84B67B5F9}"/>
+            </c:ext>
+          </c:extLst>
         </c:ser>
         <c:dLbls>
-          <c:dLblPos val="outEnd"/>
           <c:showLegendKey val="0"/>
           <c:showVal val="0"/>
           <c:showCatName val="0"/>
@@ -751,7 +784,7 @@
                 <a:cs typeface="+mn-cs"/>
               </a:defRPr>
             </a:pPr>
-            <a:endParaRPr lang="de-DE"/>
+            <a:endParaRPr lang="en-US"/>
           </a:p>
         </c:txPr>
         <c:crossAx val="604601584"/>
@@ -817,7 +850,6 @@
               </a:p>
             </c:rich>
           </c:tx>
-          <c:layout/>
           <c:overlay val="0"/>
           <c:spPr>
             <a:noFill/>
@@ -843,7 +875,7 @@
                   <a:cs typeface="+mn-cs"/>
                 </a:defRPr>
               </a:pPr>
-              <a:endParaRPr lang="de-DE"/>
+              <a:endParaRPr lang="en-US"/>
             </a:p>
           </c:txPr>
         </c:title>
@@ -875,7 +907,7 @@
                 <a:cs typeface="+mn-cs"/>
               </a:defRPr>
             </a:pPr>
-            <a:endParaRPr lang="de-DE"/>
+            <a:endParaRPr lang="en-US"/>
           </a:p>
         </c:txPr>
         <c:crossAx val="604601976"/>
@@ -908,7 +940,7 @@
       <a:pPr>
         <a:defRPr/>
       </a:pPr>
-      <a:endParaRPr lang="de-DE"/>
+      <a:endParaRPr lang="en-US"/>
     </a:p>
   </c:txPr>
   <c:externalData r:id="rId3">
@@ -2134,7 +2166,7 @@
           <a:p>
             <a:fld id="{2F1C2F4C-1229-4F0D-AD9F-8D430D241292}" type="datetimeFigureOut">
               <a:rPr lang="de-DE" smtClean="0"/>
-              <a:t>23.01.2016</a:t>
+              <a:t>24.01.2016</a:t>
             </a:fld>
             <a:endParaRPr lang="de-DE"/>
           </a:p>
@@ -2176,7 +2208,7 @@
           <a:p>
             <a:fld id="{E6DB3543-6F35-44A5-8304-875EBA0AE9B6}" type="slidenum">
               <a:rPr lang="de-DE" smtClean="0"/>
-              <a:t>‹Nr.›</a:t>
+              <a:t>‹#›</a:t>
             </a:fld>
             <a:endParaRPr lang="de-DE"/>
           </a:p>
@@ -2304,7 +2336,7 @@
           <a:p>
             <a:fld id="{2F1C2F4C-1229-4F0D-AD9F-8D430D241292}" type="datetimeFigureOut">
               <a:rPr lang="de-DE" smtClean="0"/>
-              <a:t>23.01.2016</a:t>
+              <a:t>24.01.2016</a:t>
             </a:fld>
             <a:endParaRPr lang="de-DE"/>
           </a:p>
@@ -2346,7 +2378,7 @@
           <a:p>
             <a:fld id="{E6DB3543-6F35-44A5-8304-875EBA0AE9B6}" type="slidenum">
               <a:rPr lang="de-DE" smtClean="0"/>
-              <a:t>‹Nr.›</a:t>
+              <a:t>‹#›</a:t>
             </a:fld>
             <a:endParaRPr lang="de-DE"/>
           </a:p>
@@ -2484,7 +2516,7 @@
           <a:p>
             <a:fld id="{2F1C2F4C-1229-4F0D-AD9F-8D430D241292}" type="datetimeFigureOut">
               <a:rPr lang="de-DE" smtClean="0"/>
-              <a:t>23.01.2016</a:t>
+              <a:t>24.01.2016</a:t>
             </a:fld>
             <a:endParaRPr lang="de-DE"/>
           </a:p>
@@ -2526,7 +2558,7 @@
           <a:p>
             <a:fld id="{E6DB3543-6F35-44A5-8304-875EBA0AE9B6}" type="slidenum">
               <a:rPr lang="de-DE" smtClean="0"/>
-              <a:t>‹Nr.›</a:t>
+              <a:t>‹#›</a:t>
             </a:fld>
             <a:endParaRPr lang="de-DE"/>
           </a:p>
@@ -2654,7 +2686,7 @@
           <a:p>
             <a:fld id="{2F1C2F4C-1229-4F0D-AD9F-8D430D241292}" type="datetimeFigureOut">
               <a:rPr lang="de-DE" smtClean="0"/>
-              <a:t>23.01.2016</a:t>
+              <a:t>24.01.2016</a:t>
             </a:fld>
             <a:endParaRPr lang="de-DE"/>
           </a:p>
@@ -2696,7 +2728,7 @@
           <a:p>
             <a:fld id="{E6DB3543-6F35-44A5-8304-875EBA0AE9B6}" type="slidenum">
               <a:rPr lang="de-DE" smtClean="0"/>
-              <a:t>‹Nr.›</a:t>
+              <a:t>‹#›</a:t>
             </a:fld>
             <a:endParaRPr lang="de-DE"/>
           </a:p>
@@ -2900,7 +2932,7 @@
           <a:p>
             <a:fld id="{2F1C2F4C-1229-4F0D-AD9F-8D430D241292}" type="datetimeFigureOut">
               <a:rPr lang="de-DE" smtClean="0"/>
-              <a:t>23.01.2016</a:t>
+              <a:t>24.01.2016</a:t>
             </a:fld>
             <a:endParaRPr lang="de-DE"/>
           </a:p>
@@ -2942,7 +2974,7 @@
           <a:p>
             <a:fld id="{E6DB3543-6F35-44A5-8304-875EBA0AE9B6}" type="slidenum">
               <a:rPr lang="de-DE" smtClean="0"/>
-              <a:t>‹Nr.›</a:t>
+              <a:t>‹#›</a:t>
             </a:fld>
             <a:endParaRPr lang="de-DE"/>
           </a:p>
@@ -3132,7 +3164,7 @@
           <a:p>
             <a:fld id="{2F1C2F4C-1229-4F0D-AD9F-8D430D241292}" type="datetimeFigureOut">
               <a:rPr lang="de-DE" smtClean="0"/>
-              <a:t>23.01.2016</a:t>
+              <a:t>24.01.2016</a:t>
             </a:fld>
             <a:endParaRPr lang="de-DE"/>
           </a:p>
@@ -3174,7 +3206,7 @@
           <a:p>
             <a:fld id="{E6DB3543-6F35-44A5-8304-875EBA0AE9B6}" type="slidenum">
               <a:rPr lang="de-DE" smtClean="0"/>
-              <a:t>‹Nr.›</a:t>
+              <a:t>‹#›</a:t>
             </a:fld>
             <a:endParaRPr lang="de-DE"/>
           </a:p>
@@ -3499,7 +3531,7 @@
           <a:p>
             <a:fld id="{2F1C2F4C-1229-4F0D-AD9F-8D430D241292}" type="datetimeFigureOut">
               <a:rPr lang="de-DE" smtClean="0"/>
-              <a:t>23.01.2016</a:t>
+              <a:t>24.01.2016</a:t>
             </a:fld>
             <a:endParaRPr lang="de-DE"/>
           </a:p>
@@ -3541,7 +3573,7 @@
           <a:p>
             <a:fld id="{E6DB3543-6F35-44A5-8304-875EBA0AE9B6}" type="slidenum">
               <a:rPr lang="de-DE" smtClean="0"/>
-              <a:t>‹Nr.›</a:t>
+              <a:t>‹#›</a:t>
             </a:fld>
             <a:endParaRPr lang="de-DE"/>
           </a:p>
@@ -3617,7 +3649,7 @@
           <a:p>
             <a:fld id="{2F1C2F4C-1229-4F0D-AD9F-8D430D241292}" type="datetimeFigureOut">
               <a:rPr lang="de-DE" smtClean="0"/>
-              <a:t>23.01.2016</a:t>
+              <a:t>24.01.2016</a:t>
             </a:fld>
             <a:endParaRPr lang="de-DE"/>
           </a:p>
@@ -3659,7 +3691,7 @@
           <a:p>
             <a:fld id="{E6DB3543-6F35-44A5-8304-875EBA0AE9B6}" type="slidenum">
               <a:rPr lang="de-DE" smtClean="0"/>
-              <a:t>‹Nr.›</a:t>
+              <a:t>‹#›</a:t>
             </a:fld>
             <a:endParaRPr lang="de-DE"/>
           </a:p>
@@ -3712,7 +3744,7 @@
           <a:p>
             <a:fld id="{2F1C2F4C-1229-4F0D-AD9F-8D430D241292}" type="datetimeFigureOut">
               <a:rPr lang="de-DE" smtClean="0"/>
-              <a:t>23.01.2016</a:t>
+              <a:t>24.01.2016</a:t>
             </a:fld>
             <a:endParaRPr lang="de-DE"/>
           </a:p>
@@ -3754,7 +3786,7 @@
           <a:p>
             <a:fld id="{E6DB3543-6F35-44A5-8304-875EBA0AE9B6}" type="slidenum">
               <a:rPr lang="de-DE" smtClean="0"/>
-              <a:t>‹Nr.›</a:t>
+              <a:t>‹#›</a:t>
             </a:fld>
             <a:endParaRPr lang="de-DE"/>
           </a:p>
@@ -3989,7 +4021,7 @@
           <a:p>
             <a:fld id="{2F1C2F4C-1229-4F0D-AD9F-8D430D241292}" type="datetimeFigureOut">
               <a:rPr lang="de-DE" smtClean="0"/>
-              <a:t>23.01.2016</a:t>
+              <a:t>24.01.2016</a:t>
             </a:fld>
             <a:endParaRPr lang="de-DE"/>
           </a:p>
@@ -4031,7 +4063,7 @@
           <a:p>
             <a:fld id="{E6DB3543-6F35-44A5-8304-875EBA0AE9B6}" type="slidenum">
               <a:rPr lang="de-DE" smtClean="0"/>
-              <a:t>‹Nr.›</a:t>
+              <a:t>‹#›</a:t>
             </a:fld>
             <a:endParaRPr lang="de-DE"/>
           </a:p>
@@ -4242,7 +4274,7 @@
           <a:p>
             <a:fld id="{2F1C2F4C-1229-4F0D-AD9F-8D430D241292}" type="datetimeFigureOut">
               <a:rPr lang="de-DE" smtClean="0"/>
-              <a:t>23.01.2016</a:t>
+              <a:t>24.01.2016</a:t>
             </a:fld>
             <a:endParaRPr lang="de-DE"/>
           </a:p>
@@ -4284,7 +4316,7 @@
           <a:p>
             <a:fld id="{E6DB3543-6F35-44A5-8304-875EBA0AE9B6}" type="slidenum">
               <a:rPr lang="de-DE" smtClean="0"/>
-              <a:t>‹Nr.›</a:t>
+              <a:t>‹#›</a:t>
             </a:fld>
             <a:endParaRPr lang="de-DE"/>
           </a:p>
@@ -4455,7 +4487,7 @@
           <a:p>
             <a:fld id="{2F1C2F4C-1229-4F0D-AD9F-8D430D241292}" type="datetimeFigureOut">
               <a:rPr lang="de-DE" smtClean="0"/>
-              <a:t>23.01.2016</a:t>
+              <a:t>24.01.2016</a:t>
             </a:fld>
             <a:endParaRPr lang="de-DE"/>
           </a:p>
@@ -4533,7 +4565,7 @@
           <a:p>
             <a:fld id="{E6DB3543-6F35-44A5-8304-875EBA0AE9B6}" type="slidenum">
               <a:rPr lang="de-DE" smtClean="0"/>
-              <a:t>‹Nr.›</a:t>
+              <a:t>‹#›</a:t>
             </a:fld>
             <a:endParaRPr lang="de-DE"/>
           </a:p>
@@ -5207,6 +5239,286 @@
 </p:sld>
 </file>
 
+<file path=ppt/slides/slide4.xml><?xml version="1.0" encoding="utf-8"?>
+<p:sld xmlns:a="http://schemas.openxmlformats.org/drawingml/2006/main" xmlns:r="http://schemas.openxmlformats.org/officeDocument/2006/relationships" xmlns:p="http://schemas.openxmlformats.org/presentationml/2006/main">
+  <p:cSld>
+    <p:spTree>
+      <p:nvGrpSpPr>
+        <p:cNvPr id="1" name=""/>
+        <p:cNvGrpSpPr/>
+        <p:nvPr/>
+      </p:nvGrpSpPr>
+      <p:grpSpPr>
+        <a:xfrm>
+          <a:off x="0" y="0"/>
+          <a:ext cx="0" cy="0"/>
+          <a:chOff x="0" y="0"/>
+          <a:chExt cx="0" cy="0"/>
+        </a:xfrm>
+      </p:grpSpPr>
+      <p:sp>
+        <p:nvSpPr>
+          <p:cNvPr id="2" name="Title 1"/>
+          <p:cNvSpPr>
+            <a:spLocks noGrp="1"/>
+          </p:cNvSpPr>
+          <p:nvPr>
+            <p:ph type="title"/>
+          </p:nvPr>
+        </p:nvSpPr>
+        <p:spPr/>
+        <p:txBody>
+          <a:bodyPr/>
+          <a:lstStyle/>
+          <a:p>
+            <a:r>
+              <a:rPr lang="en-US" dirty="0" smtClean="0"/>
+              <a:t>Voting app</a:t>
+            </a:r>
+            <a:endParaRPr lang="en-US" dirty="0"/>
+          </a:p>
+        </p:txBody>
+      </p:sp>
+      <p:sp>
+        <p:nvSpPr>
+          <p:cNvPr id="3" name="Content Placeholder 2"/>
+          <p:cNvSpPr>
+            <a:spLocks noGrp="1"/>
+          </p:cNvSpPr>
+          <p:nvPr>
+            <p:ph idx="1"/>
+          </p:nvPr>
+        </p:nvSpPr>
+        <p:spPr/>
+        <p:txBody>
+          <a:bodyPr/>
+          <a:lstStyle/>
+          <a:p>
+            <a:r>
+              <a:rPr lang="en-US" dirty="0" smtClean="0"/>
+              <a:t>Tokens</a:t>
+            </a:r>
+          </a:p>
+          <a:p>
+            <a:pPr lvl="1"/>
+            <a:r>
+              <a:rPr lang="en-US" dirty="0" smtClean="0"/>
+              <a:t>Uuid4 as tokens</a:t>
+            </a:r>
+          </a:p>
+          <a:p>
+            <a:pPr lvl="1"/>
+            <a:r>
+              <a:rPr lang="en-US" dirty="0" smtClean="0"/>
+              <a:t>Tokens are / </a:t>
+            </a:r>
+            <a:r>
+              <a:rPr lang="en-US" dirty="0" err="1" smtClean="0"/>
+              <a:t>Wahlkreis</a:t>
+            </a:r>
+            <a:r>
+              <a:rPr lang="en-US" dirty="0" smtClean="0"/>
+              <a:t> and election</a:t>
+            </a:r>
+          </a:p>
+          <a:p>
+            <a:r>
+              <a:rPr lang="en-US" dirty="0" smtClean="0"/>
+              <a:t>Voting Ballot</a:t>
+            </a:r>
+          </a:p>
+          <a:p>
+            <a:pPr lvl="1"/>
+            <a:r>
+              <a:rPr lang="en-US" dirty="0" smtClean="0"/>
+              <a:t>Neutral Format</a:t>
+            </a:r>
+          </a:p>
+          <a:p>
+            <a:pPr lvl="1"/>
+            <a:r>
+              <a:rPr lang="en-US" dirty="0" smtClean="0"/>
+              <a:t>Checks token, removes used token and inserts vote in 1 transaction</a:t>
+            </a:r>
+          </a:p>
+          <a:p>
+            <a:endParaRPr lang="de-DE" dirty="0" smtClean="0"/>
+          </a:p>
+          <a:p>
+            <a:r>
+              <a:rPr lang="de-DE" dirty="0" smtClean="0"/>
+              <a:t>DEMO</a:t>
+            </a:r>
+            <a:endParaRPr lang="en-US" dirty="0" smtClean="0"/>
+          </a:p>
+        </p:txBody>
+      </p:sp>
+    </p:spTree>
+    <p:extLst>
+      <p:ext uri="{BB962C8B-B14F-4D97-AF65-F5344CB8AC3E}">
+        <p14:creationId xmlns:p14="http://schemas.microsoft.com/office/powerpoint/2010/main" val="59666979"/>
+      </p:ext>
+    </p:extLst>
+  </p:cSld>
+  <p:clrMapOvr>
+    <a:masterClrMapping/>
+  </p:clrMapOvr>
+</p:sld>
+</file>
+
+<file path=ppt/slides/slide5.xml><?xml version="1.0" encoding="utf-8"?>
+<p:sld xmlns:a="http://schemas.openxmlformats.org/drawingml/2006/main" xmlns:r="http://schemas.openxmlformats.org/officeDocument/2006/relationships" xmlns:p="http://schemas.openxmlformats.org/presentationml/2006/main">
+  <p:cSld>
+    <p:spTree>
+      <p:nvGrpSpPr>
+        <p:cNvPr id="1" name=""/>
+        <p:cNvGrpSpPr/>
+        <p:nvPr/>
+      </p:nvGrpSpPr>
+      <p:grpSpPr>
+        <a:xfrm>
+          <a:off x="0" y="0"/>
+          <a:ext cx="0" cy="0"/>
+          <a:chOff x="0" y="0"/>
+          <a:chExt cx="0" cy="0"/>
+        </a:xfrm>
+      </p:grpSpPr>
+      <p:sp>
+        <p:nvSpPr>
+          <p:cNvPr id="2" name="Title 1"/>
+          <p:cNvSpPr>
+            <a:spLocks noGrp="1"/>
+          </p:cNvSpPr>
+          <p:nvPr>
+            <p:ph type="title"/>
+          </p:nvPr>
+        </p:nvSpPr>
+        <p:spPr/>
+        <p:txBody>
+          <a:bodyPr/>
+          <a:lstStyle/>
+          <a:p>
+            <a:r>
+              <a:rPr lang="en-US" dirty="0" smtClean="0"/>
+              <a:t>Hyper </a:t>
+            </a:r>
+            <a:endParaRPr lang="en-US" dirty="0"/>
+          </a:p>
+        </p:txBody>
+      </p:sp>
+      <p:sp>
+        <p:nvSpPr>
+          <p:cNvPr id="3" name="Content Placeholder 2"/>
+          <p:cNvSpPr>
+            <a:spLocks noGrp="1"/>
+          </p:cNvSpPr>
+          <p:nvPr>
+            <p:ph idx="1"/>
+          </p:nvPr>
+        </p:nvSpPr>
+        <p:spPr/>
+        <p:txBody>
+          <a:bodyPr/>
+          <a:lstStyle/>
+          <a:p>
+            <a:r>
+              <a:rPr lang="en-US" dirty="0" smtClean="0"/>
+              <a:t>Project was partially ported to hyper</a:t>
+            </a:r>
+          </a:p>
+          <a:p>
+            <a:r>
+              <a:rPr lang="en-US" dirty="0" smtClean="0"/>
+              <a:t>Porting:</a:t>
+            </a:r>
+          </a:p>
+          <a:p>
+            <a:pPr lvl="1"/>
+            <a:r>
+              <a:rPr lang="en-US" dirty="0" smtClean="0"/>
+              <a:t>Schema </a:t>
+            </a:r>
+            <a:r>
+              <a:rPr lang="en-US" dirty="0"/>
+              <a:t>had to be adapted </a:t>
+            </a:r>
+            <a:r>
+              <a:rPr lang="en-US" dirty="0" smtClean="0"/>
+              <a:t>(SERIAL For </a:t>
+            </a:r>
+            <a:r>
+              <a:rPr lang="en-US" dirty="0"/>
+              <a:t>PK not recognized by </a:t>
+            </a:r>
+            <a:r>
+              <a:rPr lang="en-US" dirty="0" smtClean="0"/>
+              <a:t>hyper)</a:t>
+            </a:r>
+          </a:p>
+          <a:p>
+            <a:pPr lvl="1"/>
+            <a:r>
+              <a:rPr lang="en-US" dirty="0" smtClean="0"/>
+              <a:t>Greatest Not Implemented Yet</a:t>
+            </a:r>
+          </a:p>
+          <a:p>
+            <a:pPr lvl="1"/>
+            <a:r>
+              <a:rPr lang="en-US" dirty="0" smtClean="0"/>
+              <a:t>No Return Next in hyper</a:t>
+            </a:r>
+          </a:p>
+          <a:p>
+            <a:pPr lvl="1"/>
+            <a:r>
+              <a:rPr lang="en-US" dirty="0" smtClean="0"/>
+              <a:t>No Temp tables</a:t>
+            </a:r>
+          </a:p>
+          <a:p>
+            <a:r>
+              <a:rPr lang="en-US" dirty="0" smtClean="0"/>
+              <a:t>Performance</a:t>
+            </a:r>
+          </a:p>
+          <a:p>
+            <a:pPr lvl="1"/>
+            <a:r>
+              <a:rPr lang="en-US" dirty="0" smtClean="0"/>
+              <a:t>Aggregation of votes was impressive (not measures, but seconds as opposed to minutes)</a:t>
+            </a:r>
+          </a:p>
+          <a:p>
+            <a:pPr lvl="1"/>
+            <a:r>
+              <a:rPr lang="en-US" dirty="0" smtClean="0"/>
+              <a:t>Speed of queries on aggregated data closely resembles </a:t>
+            </a:r>
+            <a:r>
+              <a:rPr lang="en-US" dirty="0" err="1" smtClean="0"/>
+              <a:t>postgres</a:t>
+            </a:r>
+            <a:endParaRPr lang="en-US" dirty="0" smtClean="0"/>
+          </a:p>
+          <a:p>
+            <a:endParaRPr lang="en-US" dirty="0"/>
+          </a:p>
+        </p:txBody>
+      </p:sp>
+    </p:spTree>
+    <p:extLst>
+      <p:ext uri="{BB962C8B-B14F-4D97-AF65-F5344CB8AC3E}">
+        <p14:creationId xmlns:p14="http://schemas.microsoft.com/office/powerpoint/2010/main" val="868926074"/>
+      </p:ext>
+    </p:extLst>
+  </p:cSld>
+  <p:clrMapOvr>
+    <a:masterClrMapping/>
+  </p:clrMapOvr>
+</p:sld>
+</file>
+
 <file path=ppt/theme/theme1.xml><?xml version="1.0" encoding="utf-8"?>
 <a:theme xmlns:a="http://schemas.openxmlformats.org/drawingml/2006/main" name="Office Theme">
   <a:themeElements>

</xml_diff>